<commit_message>
added a conclusion slide
</commit_message>
<xml_diff>
--- a/JuliaCon 2019/talk/talk.pptx
+++ b/JuliaCon 2019/talk/talk.pptx
@@ -5,10 +5,10 @@
     <p:sldMasterId id="2147483793" r:id="rId1"/>
   </p:sldMasterIdLst>
   <p:notesMasterIdLst>
-    <p:notesMasterId r:id="rId11"/>
+    <p:notesMasterId r:id="rId12"/>
   </p:notesMasterIdLst>
   <p:handoutMasterIdLst>
-    <p:handoutMasterId r:id="rId12"/>
+    <p:handoutMasterId r:id="rId13"/>
   </p:handoutMasterIdLst>
   <p:sldIdLst>
     <p:sldId id="256" r:id="rId2"/>
@@ -19,7 +19,8 @@
     <p:sldId id="263" r:id="rId7"/>
     <p:sldId id="264" r:id="rId8"/>
     <p:sldId id="265" r:id="rId9"/>
-    <p:sldId id="267" r:id="rId10"/>
+    <p:sldId id="268" r:id="rId10"/>
+    <p:sldId id="267" r:id="rId11"/>
   </p:sldIdLst>
   <p:sldSz cx="9144000" cy="6858000" type="screen4x3"/>
   <p:notesSz cx="6858000" cy="9144000"/>
@@ -203,7 +204,7 @@
           <a:p>
             <a:fld id="{E2ACDEAC-E5CC-8B41-B316-53EBCB050FF4}" type="datetime1">
               <a:rPr lang="en-US" smtClean="0"/>
-              <a:t>19/7/21</a:t>
+              <a:t>19/7/24</a:t>
             </a:fld>
             <a:endParaRPr lang="en-US"/>
           </a:p>
@@ -369,7 +370,7 @@
           <a:p>
             <a:fld id="{245DAA6D-D858-2B46-97E7-B24926C0D099}" type="datetime1">
               <a:rPr lang="en-US" smtClean="0"/>
-              <a:t>19/7/21</a:t>
+              <a:t>19/7/24</a:t>
             </a:fld>
             <a:endParaRPr lang="en-US"/>
           </a:p>
@@ -987,7 +988,7 @@
           <a:p>
             <a:fld id="{EAD0B1EF-E583-694E-8D38-E0A0E51EB26D}" type="datetime1">
               <a:rPr lang="en-US" smtClean="0"/>
-              <a:t>19/7/21</a:t>
+              <a:t>19/7/24</a:t>
             </a:fld>
             <a:endParaRPr lang="en-US"/>
           </a:p>
@@ -1158,7 +1159,7 @@
           <a:p>
             <a:fld id="{6735F89A-BBDE-F341-9F70-658ACF8DB38F}" type="datetime1">
               <a:rPr lang="en-US" smtClean="0"/>
-              <a:t>19/7/21</a:t>
+              <a:t>19/7/24</a:t>
             </a:fld>
             <a:endParaRPr lang="en-US"/>
           </a:p>
@@ -1338,7 +1339,7 @@
           <a:p>
             <a:fld id="{FD9FE6DF-EA45-1040-8BCB-A4E3C5F85D80}" type="datetime1">
               <a:rPr lang="en-US" smtClean="0"/>
-              <a:t>19/7/21</a:t>
+              <a:t>19/7/24</a:t>
             </a:fld>
             <a:endParaRPr lang="en-US"/>
           </a:p>
@@ -1508,7 +1509,7 @@
           <a:p>
             <a:fld id="{7BBE9DF5-CCF5-9A4A-A2B5-B998A4FFB9DC}" type="datetime1">
               <a:rPr lang="en-US" smtClean="0"/>
-              <a:t>19/7/21</a:t>
+              <a:t>19/7/24</a:t>
             </a:fld>
             <a:endParaRPr lang="en-US"/>
           </a:p>
@@ -1754,7 +1755,7 @@
           <a:p>
             <a:fld id="{8FBAACAA-29B3-EC4F-8BEC-4CD60751DCA5}" type="datetime1">
               <a:rPr lang="en-US" smtClean="0"/>
-              <a:t>19/7/21</a:t>
+              <a:t>19/7/24</a:t>
             </a:fld>
             <a:endParaRPr lang="en-US"/>
           </a:p>
@@ -2042,7 +2043,7 @@
           <a:p>
             <a:fld id="{2670E2EC-FF62-5F46-B83E-6E15E6D91BCA}" type="datetime1">
               <a:rPr lang="en-US" smtClean="0"/>
-              <a:t>19/7/21</a:t>
+              <a:t>19/7/24</a:t>
             </a:fld>
             <a:endParaRPr lang="en-US"/>
           </a:p>
@@ -2464,7 +2465,7 @@
           <a:p>
             <a:fld id="{0E8DD477-B100-9D4E-81EA-1FB8F1B63A3F}" type="datetime1">
               <a:rPr lang="en-US" smtClean="0"/>
-              <a:t>19/7/21</a:t>
+              <a:t>19/7/24</a:t>
             </a:fld>
             <a:endParaRPr lang="en-US"/>
           </a:p>
@@ -2582,7 +2583,7 @@
           <a:p>
             <a:fld id="{8EBDA6DC-79F5-9F42-93F8-95E27B6C1CCA}" type="datetime1">
               <a:rPr lang="en-US" smtClean="0"/>
-              <a:t>19/7/21</a:t>
+              <a:t>19/7/24</a:t>
             </a:fld>
             <a:endParaRPr lang="en-US"/>
           </a:p>
@@ -2677,7 +2678,7 @@
           <a:p>
             <a:fld id="{B9E3C1B5-628B-294C-AC24-F9F9D9AD8399}" type="datetime1">
               <a:rPr lang="en-US" smtClean="0"/>
-              <a:t>19/7/21</a:t>
+              <a:t>19/7/24</a:t>
             </a:fld>
             <a:endParaRPr lang="en-US"/>
           </a:p>
@@ -2954,7 +2955,7 @@
           <a:p>
             <a:fld id="{11EEC630-3D7E-9743-AED7-200621DD7280}" type="datetime1">
               <a:rPr lang="en-US" smtClean="0"/>
-              <a:t>19/7/21</a:t>
+              <a:t>19/7/24</a:t>
             </a:fld>
             <a:endParaRPr lang="en-US"/>
           </a:p>
@@ -3208,7 +3209,7 @@
           <a:p>
             <a:fld id="{0521D3A2-B25E-AF48-AC49-30A7E1977678}" type="datetime1">
               <a:rPr lang="en-US" smtClean="0"/>
-              <a:t>19/7/21</a:t>
+              <a:t>19/7/24</a:t>
             </a:fld>
             <a:endParaRPr lang="en-US"/>
           </a:p>
@@ -3421,7 +3422,7 @@
           <a:p>
             <a:fld id="{4D719533-ED84-7E4D-980A-435969B8F38D}" type="datetime1">
               <a:rPr lang="en-US" smtClean="0"/>
-              <a:t>19/7/21</a:t>
+              <a:t>19/7/24</a:t>
             </a:fld>
             <a:endParaRPr lang="en-US"/>
           </a:p>
@@ -3949,8 +3950,8 @@
         </p:nvSpPr>
         <p:spPr>
           <a:xfrm>
-            <a:off x="1720204" y="5986168"/>
-            <a:ext cx="6180116" cy="477054"/>
+            <a:off x="1720204" y="5864741"/>
+            <a:ext cx="6180116" cy="861774"/>
           </a:xfrm>
           <a:prstGeom prst="rect">
             <a:avLst/>
@@ -3967,16 +3968,35 @@
               <a:t>Package: </a:t>
             </a:r>
             <a:r>
-              <a:rPr lang="en-US" sz="2500" b="1" dirty="0" err="1"/>
+              <a:rPr lang="en-US" sz="2500" dirty="0" err="1"/>
               <a:t>github.com</a:t>
             </a:r>
             <a:r>
-              <a:rPr lang="en-US" sz="2500" b="1" dirty="0"/>
+              <a:rPr lang="en-US" sz="2500" dirty="0"/>
               <a:t>/biona001/</a:t>
             </a:r>
             <a:r>
-              <a:rPr lang="en-US" sz="2500" b="1" dirty="0" err="1"/>
+              <a:rPr lang="en-US" sz="2500" dirty="0" err="1" smtClean="0"/>
               <a:t>MendelIHT.jl</a:t>
+            </a:r>
+            <a:endParaRPr lang="en-US" sz="2500" dirty="0" smtClean="0"/>
+          </a:p>
+          <a:p>
+            <a:r>
+              <a:rPr lang="en-US" sz="2500" b="1" dirty="0" smtClean="0"/>
+              <a:t>Slides: </a:t>
+            </a:r>
+            <a:r>
+              <a:rPr lang="en-US" sz="2500" dirty="0" err="1" smtClean="0"/>
+              <a:t>github.com</a:t>
+            </a:r>
+            <a:r>
+              <a:rPr lang="en-US" sz="2500" dirty="0"/>
+              <a:t>/biona001/public-</a:t>
+            </a:r>
+            <a:r>
+              <a:rPr lang="en-US" sz="2500" dirty="0" smtClean="0"/>
+              <a:t>talks</a:t>
             </a:r>
             <a:endParaRPr lang="en-US" sz="2500" b="1" dirty="0"/>
           </a:p>
@@ -3986,6 +4006,496 @@
     <p:extLst>
       <p:ext uri="{BB962C8B-B14F-4D97-AF65-F5344CB8AC3E}">
         <p14:creationId xmlns:p14="http://schemas.microsoft.com/office/powerpoint/2010/main" val="276017916"/>
+      </p:ext>
+    </p:extLst>
+  </p:cSld>
+  <p:clrMapOvr>
+    <a:masterClrMapping/>
+  </p:clrMapOvr>
+  <p:timing>
+    <p:tnLst>
+      <p:par>
+        <p:cTn xmlns:p14="http://schemas.microsoft.com/office/powerpoint/2010/main" id="1" dur="indefinite" restart="never" nodeType="tmRoot"/>
+      </p:par>
+    </p:tnLst>
+  </p:timing>
+</p:sld>
+</file>
+
+<file path=ppt/slides/slide10.xml><?xml version="1.0" encoding="utf-8"?>
+<p:sld xmlns:a="http://schemas.openxmlformats.org/drawingml/2006/main" xmlns:r="http://schemas.openxmlformats.org/officeDocument/2006/relationships" xmlns:p="http://schemas.openxmlformats.org/presentationml/2006/main">
+  <p:cSld>
+    <p:spTree>
+      <p:nvGrpSpPr>
+        <p:cNvPr id="1" name=""/>
+        <p:cNvGrpSpPr/>
+        <p:nvPr/>
+      </p:nvGrpSpPr>
+      <p:grpSpPr>
+        <a:xfrm>
+          <a:off x="0" y="0"/>
+          <a:ext cx="0" cy="0"/>
+          <a:chOff x="0" y="0"/>
+          <a:chExt cx="0" cy="0"/>
+        </a:xfrm>
+      </p:grpSpPr>
+      <p:sp>
+        <p:nvSpPr>
+          <p:cNvPr id="2" name="Title 1"/>
+          <p:cNvSpPr>
+            <a:spLocks noGrp="1"/>
+          </p:cNvSpPr>
+          <p:nvPr>
+            <p:ph type="title"/>
+          </p:nvPr>
+        </p:nvSpPr>
+        <p:spPr/>
+        <p:txBody>
+          <a:bodyPr/>
+          <a:lstStyle/>
+          <a:p>
+            <a:r>
+              <a:rPr lang="en-US" dirty="0" smtClean="0"/>
+              <a:t>Acknowledgements</a:t>
+            </a:r>
+            <a:endParaRPr lang="en-US" dirty="0"/>
+          </a:p>
+        </p:txBody>
+      </p:sp>
+      <p:sp>
+        <p:nvSpPr>
+          <p:cNvPr id="3" name="Content Placeholder 2"/>
+          <p:cNvSpPr>
+            <a:spLocks noGrp="1"/>
+          </p:cNvSpPr>
+          <p:nvPr>
+            <p:ph idx="1"/>
+          </p:nvPr>
+        </p:nvSpPr>
+        <p:spPr>
+          <a:xfrm>
+            <a:off x="457200" y="1396080"/>
+            <a:ext cx="8229600" cy="1393619"/>
+          </a:xfrm>
+        </p:spPr>
+        <p:txBody>
+          <a:bodyPr>
+            <a:normAutofit/>
+          </a:bodyPr>
+          <a:lstStyle/>
+          <a:p>
+            <a:r>
+              <a:rPr lang="en-US" sz="2000" dirty="0" err="1" smtClean="0"/>
+              <a:t>JuliaCon</a:t>
+            </a:r>
+            <a:r>
+              <a:rPr lang="en-US" sz="2000" dirty="0" smtClean="0"/>
+              <a:t> 2019 for Travel </a:t>
+            </a:r>
+            <a:r>
+              <a:rPr lang="en-US" sz="2000" dirty="0" err="1"/>
+              <a:t>A</a:t>
+            </a:r>
+            <a:r>
+              <a:rPr lang="en-US" sz="2000" dirty="0" err="1" smtClean="0"/>
+              <a:t>ssistence</a:t>
+            </a:r>
+            <a:endParaRPr lang="en-US" sz="2000" dirty="0" smtClean="0"/>
+          </a:p>
+          <a:p>
+            <a:r>
+              <a:rPr lang="en-US" sz="2000" dirty="0" smtClean="0"/>
+              <a:t>Google Summer of Code 2018</a:t>
+            </a:r>
+          </a:p>
+          <a:p>
+            <a:r>
+              <a:rPr lang="en-US" sz="2000" dirty="0"/>
+              <a:t>NIH T32-</a:t>
+            </a:r>
+            <a:r>
+              <a:rPr lang="en-US" sz="2000" dirty="0" smtClean="0"/>
+              <a:t>HG002536 (GATP) training grant</a:t>
+            </a:r>
+          </a:p>
+        </p:txBody>
+      </p:sp>
+      <p:sp>
+        <p:nvSpPr>
+          <p:cNvPr id="4" name="Title 1"/>
+          <p:cNvSpPr txBox="1">
+            <a:spLocks/>
+          </p:cNvSpPr>
+          <p:nvPr/>
+        </p:nvSpPr>
+        <p:spPr>
+          <a:xfrm>
+            <a:off x="348788" y="3284775"/>
+            <a:ext cx="8229600" cy="1143000"/>
+          </a:xfrm>
+          <a:prstGeom prst="rect">
+            <a:avLst/>
+          </a:prstGeom>
+        </p:spPr>
+        <p:txBody>
+          <a:bodyPr vert="horz" lIns="91440" tIns="45720" rIns="91440" bIns="45720" rtlCol="0" anchor="ctr">
+            <a:normAutofit/>
+          </a:bodyPr>
+          <a:lstStyle>
+            <a:lvl1pPr algn="ctr" defTabSz="457200" rtl="0" eaLnBrk="1" latinLnBrk="0" hangingPunct="1">
+              <a:spcBef>
+                <a:spcPct val="0"/>
+              </a:spcBef>
+              <a:buNone/>
+              <a:defRPr sz="4400" kern="1200">
+                <a:solidFill>
+                  <a:schemeClr val="tx1"/>
+                </a:solidFill>
+                <a:latin typeface="+mj-lt"/>
+                <a:ea typeface="+mj-ea"/>
+                <a:cs typeface="+mj-cs"/>
+              </a:defRPr>
+            </a:lvl1pPr>
+          </a:lstStyle>
+          <a:p>
+            <a:r>
+              <a:rPr lang="en-US" dirty="0" smtClean="0"/>
+              <a:t>References</a:t>
+            </a:r>
+            <a:endParaRPr lang="en-US" dirty="0"/>
+          </a:p>
+        </p:txBody>
+      </p:sp>
+      <p:sp>
+        <p:nvSpPr>
+          <p:cNvPr id="5" name="Content Placeholder 2"/>
+          <p:cNvSpPr txBox="1">
+            <a:spLocks/>
+          </p:cNvSpPr>
+          <p:nvPr/>
+        </p:nvSpPr>
+        <p:spPr>
+          <a:xfrm>
+            <a:off x="457200" y="4292810"/>
+            <a:ext cx="8229600" cy="2352561"/>
+          </a:xfrm>
+          <a:prstGeom prst="rect">
+            <a:avLst/>
+          </a:prstGeom>
+        </p:spPr>
+        <p:txBody>
+          <a:bodyPr vert="horz" lIns="91440" tIns="45720" rIns="91440" bIns="45720" rtlCol="0">
+            <a:normAutofit lnSpcReduction="10000"/>
+          </a:bodyPr>
+          <a:lstStyle>
+            <a:lvl1pPr marL="342900" indent="-342900" algn="l" defTabSz="457200" rtl="0" eaLnBrk="1" latinLnBrk="0" hangingPunct="1">
+              <a:spcBef>
+                <a:spcPct val="20000"/>
+              </a:spcBef>
+              <a:buFont typeface="Arial"/>
+              <a:buChar char="•"/>
+              <a:defRPr sz="3200" kern="1200">
+                <a:solidFill>
+                  <a:schemeClr val="tx1"/>
+                </a:solidFill>
+                <a:latin typeface="+mn-lt"/>
+                <a:ea typeface="+mn-ea"/>
+                <a:cs typeface="+mn-cs"/>
+              </a:defRPr>
+            </a:lvl1pPr>
+            <a:lvl2pPr marL="742950" indent="-285750" algn="l" defTabSz="457200" rtl="0" eaLnBrk="1" latinLnBrk="0" hangingPunct="1">
+              <a:spcBef>
+                <a:spcPct val="20000"/>
+              </a:spcBef>
+              <a:buFont typeface="Arial"/>
+              <a:buChar char="–"/>
+              <a:defRPr sz="2800" kern="1200">
+                <a:solidFill>
+                  <a:schemeClr val="tx1"/>
+                </a:solidFill>
+                <a:latin typeface="+mn-lt"/>
+                <a:ea typeface="+mn-ea"/>
+                <a:cs typeface="+mn-cs"/>
+              </a:defRPr>
+            </a:lvl2pPr>
+            <a:lvl3pPr marL="1143000" indent="-228600" algn="l" defTabSz="457200" rtl="0" eaLnBrk="1" latinLnBrk="0" hangingPunct="1">
+              <a:spcBef>
+                <a:spcPct val="20000"/>
+              </a:spcBef>
+              <a:buFont typeface="Arial"/>
+              <a:buChar char="•"/>
+              <a:defRPr sz="2400" kern="1200">
+                <a:solidFill>
+                  <a:schemeClr val="tx1"/>
+                </a:solidFill>
+                <a:latin typeface="+mn-lt"/>
+                <a:ea typeface="+mn-ea"/>
+                <a:cs typeface="+mn-cs"/>
+              </a:defRPr>
+            </a:lvl3pPr>
+            <a:lvl4pPr marL="1600200" indent="-228600" algn="l" defTabSz="457200" rtl="0" eaLnBrk="1" latinLnBrk="0" hangingPunct="1">
+              <a:spcBef>
+                <a:spcPct val="20000"/>
+              </a:spcBef>
+              <a:buFont typeface="Arial"/>
+              <a:buChar char="–"/>
+              <a:defRPr sz="2000" kern="1200">
+                <a:solidFill>
+                  <a:schemeClr val="tx1"/>
+                </a:solidFill>
+                <a:latin typeface="+mn-lt"/>
+                <a:ea typeface="+mn-ea"/>
+                <a:cs typeface="+mn-cs"/>
+              </a:defRPr>
+            </a:lvl4pPr>
+            <a:lvl5pPr marL="2057400" indent="-228600" algn="l" defTabSz="457200" rtl="0" eaLnBrk="1" latinLnBrk="0" hangingPunct="1">
+              <a:spcBef>
+                <a:spcPct val="20000"/>
+              </a:spcBef>
+              <a:buFont typeface="Arial"/>
+              <a:buChar char="»"/>
+              <a:defRPr sz="2000" kern="1200">
+                <a:solidFill>
+                  <a:schemeClr val="tx1"/>
+                </a:solidFill>
+                <a:latin typeface="+mn-lt"/>
+                <a:ea typeface="+mn-ea"/>
+                <a:cs typeface="+mn-cs"/>
+              </a:defRPr>
+            </a:lvl5pPr>
+            <a:lvl6pPr marL="2514600" indent="-228600" algn="l" defTabSz="457200" rtl="0" eaLnBrk="1" latinLnBrk="0" hangingPunct="1">
+              <a:spcBef>
+                <a:spcPct val="20000"/>
+              </a:spcBef>
+              <a:buFont typeface="Arial"/>
+              <a:buChar char="•"/>
+              <a:defRPr sz="2000" kern="1200">
+                <a:solidFill>
+                  <a:schemeClr val="tx1"/>
+                </a:solidFill>
+                <a:latin typeface="+mn-lt"/>
+                <a:ea typeface="+mn-ea"/>
+                <a:cs typeface="+mn-cs"/>
+              </a:defRPr>
+            </a:lvl6pPr>
+            <a:lvl7pPr marL="2971800" indent="-228600" algn="l" defTabSz="457200" rtl="0" eaLnBrk="1" latinLnBrk="0" hangingPunct="1">
+              <a:spcBef>
+                <a:spcPct val="20000"/>
+              </a:spcBef>
+              <a:buFont typeface="Arial"/>
+              <a:buChar char="•"/>
+              <a:defRPr sz="2000" kern="1200">
+                <a:solidFill>
+                  <a:schemeClr val="tx1"/>
+                </a:solidFill>
+                <a:latin typeface="+mn-lt"/>
+                <a:ea typeface="+mn-ea"/>
+                <a:cs typeface="+mn-cs"/>
+              </a:defRPr>
+            </a:lvl7pPr>
+            <a:lvl8pPr marL="3429000" indent="-228600" algn="l" defTabSz="457200" rtl="0" eaLnBrk="1" latinLnBrk="0" hangingPunct="1">
+              <a:spcBef>
+                <a:spcPct val="20000"/>
+              </a:spcBef>
+              <a:buFont typeface="Arial"/>
+              <a:buChar char="•"/>
+              <a:defRPr sz="2000" kern="1200">
+                <a:solidFill>
+                  <a:schemeClr val="tx1"/>
+                </a:solidFill>
+                <a:latin typeface="+mn-lt"/>
+                <a:ea typeface="+mn-ea"/>
+                <a:cs typeface="+mn-cs"/>
+              </a:defRPr>
+            </a:lvl8pPr>
+            <a:lvl9pPr marL="3886200" indent="-228600" algn="l" defTabSz="457200" rtl="0" eaLnBrk="1" latinLnBrk="0" hangingPunct="1">
+              <a:spcBef>
+                <a:spcPct val="20000"/>
+              </a:spcBef>
+              <a:buFont typeface="Arial"/>
+              <a:buChar char="•"/>
+              <a:defRPr sz="2000" kern="1200">
+                <a:solidFill>
+                  <a:schemeClr val="tx1"/>
+                </a:solidFill>
+                <a:latin typeface="+mn-lt"/>
+                <a:ea typeface="+mn-ea"/>
+                <a:cs typeface="+mn-cs"/>
+              </a:defRPr>
+            </a:lvl9pPr>
+          </a:lstStyle>
+          <a:p>
+            <a:r>
+              <a:rPr lang="en-US" sz="2000" dirty="0" smtClean="0"/>
+              <a:t>Package</a:t>
+            </a:r>
+            <a:r>
+              <a:rPr lang="en-US" sz="2000" dirty="0"/>
+              <a:t>: </a:t>
+            </a:r>
+            <a:r>
+              <a:rPr lang="en-US" sz="2000" dirty="0" err="1" smtClean="0"/>
+              <a:t>github.com</a:t>
+            </a:r>
+            <a:r>
+              <a:rPr lang="en-US" sz="2000" dirty="0"/>
+              <a:t>/biona001/</a:t>
+            </a:r>
+            <a:r>
+              <a:rPr lang="en-US" sz="2000" dirty="0" err="1" smtClean="0"/>
+              <a:t>MendelIHT.jl</a:t>
+            </a:r>
+            <a:endParaRPr lang="en-US" sz="2000" dirty="0" smtClean="0"/>
+          </a:p>
+          <a:p>
+            <a:r>
+              <a:rPr lang="en-US" sz="2000" dirty="0" smtClean="0"/>
+              <a:t>Chu et al. </a:t>
+            </a:r>
+            <a:r>
+              <a:rPr lang="en-US" sz="2000" i="1" dirty="0"/>
+              <a:t>Multivariate GWAS, Generalized </a:t>
+            </a:r>
+            <a:r>
+              <a:rPr lang="en-US" sz="2000" i="1" dirty="0" smtClean="0"/>
+              <a:t>Linear Models</a:t>
+            </a:r>
+            <a:r>
+              <a:rPr lang="en-US" sz="2000" i="1" dirty="0"/>
+              <a:t>, Prior Weights, and Double </a:t>
+            </a:r>
+            <a:r>
+              <a:rPr lang="en-US" sz="2000" i="1" dirty="0" err="1" smtClean="0"/>
+              <a:t>Sparsity</a:t>
+            </a:r>
+            <a:r>
+              <a:rPr lang="en-US" sz="2000" i="1" dirty="0" smtClean="0"/>
+              <a:t>.</a:t>
+            </a:r>
+            <a:r>
+              <a:rPr lang="en-US" sz="2000" dirty="0" smtClean="0"/>
+              <a:t> </a:t>
+            </a:r>
+            <a:r>
+              <a:rPr lang="en-US" sz="2000" dirty="0" err="1" smtClean="0"/>
+              <a:t>BioRxiv</a:t>
+            </a:r>
+            <a:r>
+              <a:rPr lang="en-US" sz="2000" dirty="0" smtClean="0"/>
+              <a:t> Preprint: </a:t>
+            </a:r>
+            <a:r>
+              <a:rPr lang="fi-FI" sz="2000" dirty="0" smtClean="0"/>
+              <a:t>10.1101</a:t>
+            </a:r>
+            <a:r>
+              <a:rPr lang="fi-FI" sz="2000" dirty="0"/>
+              <a:t>/</a:t>
+            </a:r>
+            <a:r>
+              <a:rPr lang="fi-FI" sz="2000" dirty="0" smtClean="0"/>
+              <a:t>697755</a:t>
+            </a:r>
+            <a:endParaRPr lang="en-US" sz="2000" dirty="0" smtClean="0"/>
+          </a:p>
+          <a:p>
+            <a:r>
+              <a:rPr lang="en-US" sz="2000" dirty="0"/>
+              <a:t>Keys et al</a:t>
+            </a:r>
+            <a:r>
+              <a:rPr lang="en-US" sz="2000" i="1" dirty="0"/>
+              <a:t>. Iterative hard </a:t>
+            </a:r>
+            <a:r>
+              <a:rPr lang="en-US" sz="2000" i="1" dirty="0" err="1"/>
+              <a:t>thresholding</a:t>
+            </a:r>
+            <a:r>
+              <a:rPr lang="en-US" sz="2000" i="1" dirty="0"/>
+              <a:t> for model selection in genome-wide association studies.</a:t>
+            </a:r>
+            <a:r>
+              <a:rPr lang="en-US" sz="2000" dirty="0"/>
+              <a:t> </a:t>
+            </a:r>
+            <a:r>
+              <a:rPr lang="hu-HU" sz="2000" dirty="0"/>
+              <a:t>Genetic Epidemiology 2017;41:756–768</a:t>
+            </a:r>
+            <a:r>
+              <a:rPr lang="hu-HU" sz="2000" dirty="0" smtClean="0"/>
+              <a:t>.</a:t>
+            </a:r>
+            <a:endParaRPr lang="en-US" sz="2000" dirty="0" smtClean="0"/>
+          </a:p>
+          <a:p>
+            <a:r>
+              <a:rPr lang="en-US" sz="2000" dirty="0" smtClean="0"/>
+              <a:t>Zhou et </a:t>
+            </a:r>
+            <a:r>
+              <a:rPr lang="en-US" sz="2000" dirty="0"/>
+              <a:t>al. </a:t>
+            </a:r>
+            <a:r>
+              <a:rPr lang="en-US" sz="2000" i="1" dirty="0" err="1"/>
+              <a:t>OpenMendel</a:t>
+            </a:r>
+            <a:r>
+              <a:rPr lang="en-US" sz="2000" i="1" dirty="0"/>
+              <a:t>: a cooperative programming </a:t>
+            </a:r>
+            <a:r>
+              <a:rPr lang="en-US" sz="2000" i="1" dirty="0" smtClean="0"/>
+              <a:t>project for </a:t>
+            </a:r>
+            <a:r>
+              <a:rPr lang="en-US" sz="2000" i="1" dirty="0"/>
+              <a:t>statistical genetics. </a:t>
+            </a:r>
+            <a:r>
+              <a:rPr lang="en-US" sz="2000" dirty="0"/>
+              <a:t>Human Genetics 2019;p. 1–11</a:t>
+            </a:r>
+            <a:r>
+              <a:rPr lang="en-US" sz="2000" dirty="0" smtClean="0"/>
+              <a:t>.</a:t>
+            </a:r>
+          </a:p>
+        </p:txBody>
+      </p:sp>
+      <p:sp>
+        <p:nvSpPr>
+          <p:cNvPr id="6" name="Slide Number Placeholder 5"/>
+          <p:cNvSpPr>
+            <a:spLocks noGrp="1"/>
+          </p:cNvSpPr>
+          <p:nvPr>
+            <p:ph type="sldNum" sz="quarter" idx="12"/>
+          </p:nvPr>
+        </p:nvSpPr>
+        <p:spPr/>
+        <p:txBody>
+          <a:bodyPr/>
+          <a:lstStyle/>
+          <a:p>
+            <a:fld id="{4C958359-9322-6441-8715-055CBE9441BE}" type="slidenum">
+              <a:rPr lang="en-US" sz="1600" smtClean="0"/>
+              <a:t>10</a:t>
+            </a:fld>
+            <a:r>
+              <a:rPr lang="en-US" sz="1600" dirty="0" smtClean="0"/>
+              <a:t>/10</a:t>
+            </a:r>
+            <a:endParaRPr lang="en-US" sz="1600" dirty="0"/>
+          </a:p>
+        </p:txBody>
+      </p:sp>
+    </p:spTree>
+    <p:extLst>
+      <p:ext uri="{BB962C8B-B14F-4D97-AF65-F5344CB8AC3E}">
+        <p14:creationId xmlns:p14="http://schemas.microsoft.com/office/powerpoint/2010/main" val="471840303"/>
       </p:ext>
     </p:extLst>
   </p:cSld>
@@ -4091,7 +4601,7 @@
         </p:nvSpPr>
         <p:spPr>
           <a:xfrm>
-            <a:off x="215454" y="6505663"/>
+            <a:off x="827643" y="6505663"/>
             <a:ext cx="8640804" cy="338554"/>
           </a:xfrm>
           <a:prstGeom prst="rect">
@@ -4202,7 +4712,7 @@
             </a:fld>
             <a:r>
               <a:rPr lang="en-US" sz="1600" dirty="0" smtClean="0"/>
-              <a:t>/9</a:t>
+              <a:t>/10</a:t>
             </a:r>
             <a:endParaRPr lang="en-US" sz="1600" dirty="0"/>
           </a:p>
@@ -4313,7 +4823,7 @@
         </p:nvSpPr>
         <p:spPr>
           <a:xfrm>
-            <a:off x="0" y="6581001"/>
+            <a:off x="1262239" y="6638622"/>
             <a:ext cx="5443381" cy="276999"/>
           </a:xfrm>
           <a:prstGeom prst="rect">
@@ -4820,8 +5330,9 @@
             </a:fld>
             <a:r>
               <a:rPr lang="en-US" sz="1600" dirty="0" smtClean="0"/>
-              <a:t>/9</a:t>
-            </a:r>
+              <a:t>/10</a:t>
+            </a:r>
+            <a:endParaRPr lang="en-US" sz="1600" dirty="0" smtClean="0"/>
           </a:p>
         </p:txBody>
       </p:sp>
@@ -5032,7 +5543,7 @@
         </p:nvSpPr>
         <p:spPr>
           <a:xfrm>
-            <a:off x="0" y="6529297"/>
+            <a:off x="931989" y="6556708"/>
             <a:ext cx="6894499" cy="369332"/>
           </a:xfrm>
           <a:prstGeom prst="rect">
@@ -5085,7 +5596,7 @@
             </a:fld>
             <a:r>
               <a:rPr lang="en-US" sz="1600" dirty="0" smtClean="0"/>
-              <a:t>/9</a:t>
+              <a:t>/10</a:t>
             </a:r>
             <a:endParaRPr lang="en-US" sz="1600" dirty="0"/>
           </a:p>
@@ -5341,7 +5852,7 @@
             </a:fld>
             <a:r>
               <a:rPr lang="en-US" sz="1600" dirty="0" smtClean="0"/>
-              <a:t>/9</a:t>
+              <a:t>/10</a:t>
             </a:r>
             <a:endParaRPr lang="en-US" sz="1600" dirty="0"/>
           </a:p>
@@ -5601,7 +6112,7 @@
             </a:fld>
             <a:r>
               <a:rPr lang="en-US" sz="1600" dirty="0" smtClean="0"/>
-              <a:t>/9</a:t>
+              <a:t>/10</a:t>
             </a:r>
             <a:endParaRPr lang="en-US" sz="1600" dirty="0"/>
           </a:p>
@@ -5952,7 +6463,7 @@
             </a:fld>
             <a:r>
               <a:rPr lang="en-US" sz="1600" dirty="0" smtClean="0"/>
-              <a:t>/9</a:t>
+              <a:t>/10</a:t>
             </a:r>
             <a:endParaRPr lang="en-US" sz="1600" dirty="0"/>
           </a:p>
@@ -6171,7 +6682,7 @@
             </a:fld>
             <a:r>
               <a:rPr lang="en-US" sz="1600" dirty="0" smtClean="0"/>
-              <a:t>/9</a:t>
+              <a:t>/10</a:t>
             </a:r>
             <a:endParaRPr lang="en-US" sz="1600" dirty="0"/>
           </a:p>
@@ -6568,8 +7079,8 @@
         </p:nvSpPr>
         <p:spPr>
           <a:xfrm>
-            <a:off x="1181024" y="5960423"/>
-            <a:ext cx="5965858" cy="523220"/>
+            <a:off x="1185735" y="5972159"/>
+            <a:ext cx="5956449" cy="523220"/>
           </a:xfrm>
           <a:prstGeom prst="rect">
             <a:avLst/>
@@ -6585,7 +7096,7 @@
             <a:pPr algn="ctr"/>
             <a:r>
               <a:rPr lang="en-US" sz="1400" dirty="0" smtClean="0"/>
-              <a:t>Benchmarked on 2019 </a:t>
+              <a:t>Matrix-vector multiplication benchmarked on 2019 </a:t>
             </a:r>
             <a:r>
               <a:rPr lang="en-US" sz="1400" dirty="0" err="1" smtClean="0"/>
@@ -6595,20 +7106,20 @@
               <a:rPr lang="en-US" sz="1400" dirty="0" smtClean="0"/>
               <a:t> pro with </a:t>
             </a:r>
+          </a:p>
+          <a:p>
+            <a:pPr algn="ctr"/>
+            <a:r>
+              <a:rPr lang="en-US" sz="1400" dirty="0" smtClean="0"/>
+              <a:t>16GB </a:t>
+            </a:r>
             <a:r>
               <a:rPr lang="en-US" sz="1400" dirty="0"/>
-              <a:t>16GB of RAM</a:t>
+              <a:t>of RAM</a:t>
             </a:r>
             <a:r>
               <a:rPr lang="en-US" sz="1400" dirty="0" smtClean="0"/>
-              <a:t>, equipped with 8 cores, </a:t>
-            </a:r>
-          </a:p>
-          <a:p>
-            <a:pPr algn="ctr"/>
-            <a:r>
-              <a:rPr lang="en-US" sz="1400" dirty="0" smtClean="0"/>
-              <a:t>each are 9</a:t>
+              <a:t>, equipped with 8 cores, each are 9</a:t>
             </a:r>
             <a:r>
               <a:rPr lang="en-US" sz="1400" baseline="30000" dirty="0" smtClean="0"/>
@@ -6676,7 +7187,7 @@
           <a:p>
             <a:r>
               <a:rPr lang="en-US" dirty="0" smtClean="0"/>
-              <a:t>Acknowledgements</a:t>
+              <a:t>Conclusions	</a:t>
             </a:r>
             <a:endParaRPr lang="en-US" dirty="0"/>
           </a:p>
@@ -6692,12 +7203,7 @@
             <p:ph idx="1"/>
           </p:nvPr>
         </p:nvSpPr>
-        <p:spPr>
-          <a:xfrm>
-            <a:off x="457200" y="1396080"/>
-            <a:ext cx="8229600" cy="1393619"/>
-          </a:xfrm>
-        </p:spPr>
+        <p:spPr/>
         <p:txBody>
           <a:bodyPr>
             <a:normAutofit/>
@@ -6705,389 +7211,40 @@
           <a:lstStyle/>
           <a:p>
             <a:r>
-              <a:rPr lang="en-US" sz="2000" dirty="0" err="1" smtClean="0"/>
-              <a:t>JuliaCon</a:t>
-            </a:r>
-            <a:r>
-              <a:rPr lang="en-US" sz="2000" dirty="0" smtClean="0"/>
-              <a:t> 2019 for Travel </a:t>
-            </a:r>
-            <a:r>
-              <a:rPr lang="en-US" sz="2000" dirty="0" err="1"/>
-              <a:t>A</a:t>
-            </a:r>
-            <a:r>
-              <a:rPr lang="en-US" sz="2000" dirty="0" err="1" smtClean="0"/>
-              <a:t>ssistence</a:t>
-            </a:r>
-            <a:endParaRPr lang="en-US" sz="2000" dirty="0" smtClean="0"/>
-          </a:p>
-          <a:p>
-            <a:r>
-              <a:rPr lang="en-US" sz="2000" dirty="0" smtClean="0"/>
-              <a:t>Google Summer of Code 2018</a:t>
-            </a:r>
-          </a:p>
-          <a:p>
-            <a:r>
-              <a:rPr lang="en-US" sz="2000" dirty="0"/>
-              <a:t>NIH T32-</a:t>
-            </a:r>
-            <a:r>
-              <a:rPr lang="en-US" sz="2000" dirty="0" smtClean="0"/>
-              <a:t>HG002536 (GATP) training grant</a:t>
-            </a:r>
-          </a:p>
-        </p:txBody>
-      </p:sp>
-      <p:sp>
-        <p:nvSpPr>
-          <p:cNvPr id="4" name="Title 1"/>
-          <p:cNvSpPr txBox="1">
-            <a:spLocks/>
-          </p:cNvSpPr>
-          <p:nvPr/>
-        </p:nvSpPr>
-        <p:spPr>
-          <a:xfrm>
-            <a:off x="348788" y="3284775"/>
-            <a:ext cx="8229600" cy="1143000"/>
-          </a:xfrm>
-          <a:prstGeom prst="rect">
-            <a:avLst/>
-          </a:prstGeom>
-        </p:spPr>
-        <p:txBody>
-          <a:bodyPr vert="horz" lIns="91440" tIns="45720" rIns="91440" bIns="45720" rtlCol="0" anchor="ctr">
-            <a:normAutofit/>
-          </a:bodyPr>
-          <a:lstStyle>
-            <a:lvl1pPr algn="ctr" defTabSz="457200" rtl="0" eaLnBrk="1" latinLnBrk="0" hangingPunct="1">
-              <a:spcBef>
-                <a:spcPct val="0"/>
-              </a:spcBef>
-              <a:buNone/>
-              <a:defRPr sz="4400" kern="1200">
-                <a:solidFill>
-                  <a:schemeClr val="tx1"/>
-                </a:solidFill>
-                <a:latin typeface="+mj-lt"/>
-                <a:ea typeface="+mj-ea"/>
-                <a:cs typeface="+mj-cs"/>
-              </a:defRPr>
-            </a:lvl1pPr>
-          </a:lstStyle>
-          <a:p>
-            <a:r>
-              <a:rPr lang="en-US" dirty="0" smtClean="0"/>
-              <a:t>References</a:t>
-            </a:r>
-            <a:endParaRPr lang="en-US" dirty="0"/>
-          </a:p>
-        </p:txBody>
-      </p:sp>
-      <p:sp>
-        <p:nvSpPr>
-          <p:cNvPr id="5" name="Content Placeholder 2"/>
-          <p:cNvSpPr txBox="1">
-            <a:spLocks/>
-          </p:cNvSpPr>
-          <p:nvPr/>
-        </p:nvSpPr>
-        <p:spPr>
-          <a:xfrm>
-            <a:off x="457200" y="4292810"/>
-            <a:ext cx="8229600" cy="2352561"/>
-          </a:xfrm>
-          <a:prstGeom prst="rect">
-            <a:avLst/>
-          </a:prstGeom>
-        </p:spPr>
-        <p:txBody>
-          <a:bodyPr vert="horz" lIns="91440" tIns="45720" rIns="91440" bIns="45720" rtlCol="0">
-            <a:normAutofit lnSpcReduction="10000"/>
-          </a:bodyPr>
-          <a:lstStyle>
-            <a:lvl1pPr marL="342900" indent="-342900" algn="l" defTabSz="457200" rtl="0" eaLnBrk="1" latinLnBrk="0" hangingPunct="1">
-              <a:spcBef>
-                <a:spcPct val="20000"/>
-              </a:spcBef>
-              <a:buFont typeface="Arial"/>
-              <a:buChar char="•"/>
-              <a:defRPr sz="3200" kern="1200">
-                <a:solidFill>
-                  <a:schemeClr val="tx1"/>
-                </a:solidFill>
-                <a:latin typeface="+mn-lt"/>
-                <a:ea typeface="+mn-ea"/>
-                <a:cs typeface="+mn-cs"/>
-              </a:defRPr>
-            </a:lvl1pPr>
-            <a:lvl2pPr marL="742950" indent="-285750" algn="l" defTabSz="457200" rtl="0" eaLnBrk="1" latinLnBrk="0" hangingPunct="1">
-              <a:spcBef>
-                <a:spcPct val="20000"/>
-              </a:spcBef>
-              <a:buFont typeface="Arial"/>
-              <a:buChar char="–"/>
-              <a:defRPr sz="2800" kern="1200">
-                <a:solidFill>
-                  <a:schemeClr val="tx1"/>
-                </a:solidFill>
-                <a:latin typeface="+mn-lt"/>
-                <a:ea typeface="+mn-ea"/>
-                <a:cs typeface="+mn-cs"/>
-              </a:defRPr>
-            </a:lvl2pPr>
-            <a:lvl3pPr marL="1143000" indent="-228600" algn="l" defTabSz="457200" rtl="0" eaLnBrk="1" latinLnBrk="0" hangingPunct="1">
-              <a:spcBef>
-                <a:spcPct val="20000"/>
-              </a:spcBef>
-              <a:buFont typeface="Arial"/>
-              <a:buChar char="•"/>
-              <a:defRPr sz="2400" kern="1200">
-                <a:solidFill>
-                  <a:schemeClr val="tx1"/>
-                </a:solidFill>
-                <a:latin typeface="+mn-lt"/>
-                <a:ea typeface="+mn-ea"/>
-                <a:cs typeface="+mn-cs"/>
-              </a:defRPr>
-            </a:lvl3pPr>
-            <a:lvl4pPr marL="1600200" indent="-228600" algn="l" defTabSz="457200" rtl="0" eaLnBrk="1" latinLnBrk="0" hangingPunct="1">
-              <a:spcBef>
-                <a:spcPct val="20000"/>
-              </a:spcBef>
-              <a:buFont typeface="Arial"/>
-              <a:buChar char="–"/>
-              <a:defRPr sz="2000" kern="1200">
-                <a:solidFill>
-                  <a:schemeClr val="tx1"/>
-                </a:solidFill>
-                <a:latin typeface="+mn-lt"/>
-                <a:ea typeface="+mn-ea"/>
-                <a:cs typeface="+mn-cs"/>
-              </a:defRPr>
-            </a:lvl4pPr>
-            <a:lvl5pPr marL="2057400" indent="-228600" algn="l" defTabSz="457200" rtl="0" eaLnBrk="1" latinLnBrk="0" hangingPunct="1">
-              <a:spcBef>
-                <a:spcPct val="20000"/>
-              </a:spcBef>
-              <a:buFont typeface="Arial"/>
-              <a:buChar char="»"/>
-              <a:defRPr sz="2000" kern="1200">
-                <a:solidFill>
-                  <a:schemeClr val="tx1"/>
-                </a:solidFill>
-                <a:latin typeface="+mn-lt"/>
-                <a:ea typeface="+mn-ea"/>
-                <a:cs typeface="+mn-cs"/>
-              </a:defRPr>
-            </a:lvl5pPr>
-            <a:lvl6pPr marL="2514600" indent="-228600" algn="l" defTabSz="457200" rtl="0" eaLnBrk="1" latinLnBrk="0" hangingPunct="1">
-              <a:spcBef>
-                <a:spcPct val="20000"/>
-              </a:spcBef>
-              <a:buFont typeface="Arial"/>
-              <a:buChar char="•"/>
-              <a:defRPr sz="2000" kern="1200">
-                <a:solidFill>
-                  <a:schemeClr val="tx1"/>
-                </a:solidFill>
-                <a:latin typeface="+mn-lt"/>
-                <a:ea typeface="+mn-ea"/>
-                <a:cs typeface="+mn-cs"/>
-              </a:defRPr>
-            </a:lvl6pPr>
-            <a:lvl7pPr marL="2971800" indent="-228600" algn="l" defTabSz="457200" rtl="0" eaLnBrk="1" latinLnBrk="0" hangingPunct="1">
-              <a:spcBef>
-                <a:spcPct val="20000"/>
-              </a:spcBef>
-              <a:buFont typeface="Arial"/>
-              <a:buChar char="•"/>
-              <a:defRPr sz="2000" kern="1200">
-                <a:solidFill>
-                  <a:schemeClr val="tx1"/>
-                </a:solidFill>
-                <a:latin typeface="+mn-lt"/>
-                <a:ea typeface="+mn-ea"/>
-                <a:cs typeface="+mn-cs"/>
-              </a:defRPr>
-            </a:lvl7pPr>
-            <a:lvl8pPr marL="3429000" indent="-228600" algn="l" defTabSz="457200" rtl="0" eaLnBrk="1" latinLnBrk="0" hangingPunct="1">
-              <a:spcBef>
-                <a:spcPct val="20000"/>
-              </a:spcBef>
-              <a:buFont typeface="Arial"/>
-              <a:buChar char="•"/>
-              <a:defRPr sz="2000" kern="1200">
-                <a:solidFill>
-                  <a:schemeClr val="tx1"/>
-                </a:solidFill>
-                <a:latin typeface="+mn-lt"/>
-                <a:ea typeface="+mn-ea"/>
-                <a:cs typeface="+mn-cs"/>
-              </a:defRPr>
-            </a:lvl8pPr>
-            <a:lvl9pPr marL="3886200" indent="-228600" algn="l" defTabSz="457200" rtl="0" eaLnBrk="1" latinLnBrk="0" hangingPunct="1">
-              <a:spcBef>
-                <a:spcPct val="20000"/>
-              </a:spcBef>
-              <a:buFont typeface="Arial"/>
-              <a:buChar char="•"/>
-              <a:defRPr sz="2000" kern="1200">
-                <a:solidFill>
-                  <a:schemeClr val="tx1"/>
-                </a:solidFill>
-                <a:latin typeface="+mn-lt"/>
-                <a:ea typeface="+mn-ea"/>
-                <a:cs typeface="+mn-cs"/>
-              </a:defRPr>
-            </a:lvl9pPr>
-          </a:lstStyle>
-          <a:p>
-            <a:r>
-              <a:rPr lang="en-US" sz="2000" dirty="0" smtClean="0"/>
-              <a:t>Package</a:t>
-            </a:r>
-            <a:r>
-              <a:rPr lang="en-US" sz="2000" dirty="0"/>
-              <a:t>: </a:t>
-            </a:r>
-            <a:r>
-              <a:rPr lang="en-US" sz="2000" dirty="0" err="1" smtClean="0"/>
-              <a:t>github.com</a:t>
-            </a:r>
-            <a:r>
-              <a:rPr lang="en-US" sz="2000" dirty="0"/>
-              <a:t>/biona001/</a:t>
-            </a:r>
-            <a:r>
-              <a:rPr lang="en-US" sz="2000" dirty="0" err="1" smtClean="0"/>
-              <a:t>MendelIHT.jl</a:t>
-            </a:r>
-            <a:endParaRPr lang="en-US" sz="2000" dirty="0" smtClean="0"/>
-          </a:p>
-          <a:p>
-            <a:r>
-              <a:rPr lang="en-US" sz="2000" dirty="0" smtClean="0"/>
-              <a:t>Chu et al. </a:t>
-            </a:r>
-            <a:r>
-              <a:rPr lang="en-US" sz="2000" i="1" dirty="0"/>
-              <a:t>Multivariate GWAS, Generalized </a:t>
-            </a:r>
-            <a:r>
-              <a:rPr lang="en-US" sz="2000" i="1" dirty="0" smtClean="0"/>
-              <a:t>Linear Models</a:t>
-            </a:r>
-            <a:r>
-              <a:rPr lang="en-US" sz="2000" i="1" dirty="0"/>
-              <a:t>, Prior Weights, and Double </a:t>
-            </a:r>
-            <a:r>
-              <a:rPr lang="en-US" sz="2000" i="1" dirty="0" err="1" smtClean="0"/>
-              <a:t>Sparsity</a:t>
-            </a:r>
-            <a:r>
-              <a:rPr lang="en-US" sz="2000" i="1" dirty="0" smtClean="0"/>
-              <a:t>.</a:t>
-            </a:r>
-            <a:r>
-              <a:rPr lang="en-US" sz="2000" dirty="0" smtClean="0"/>
-              <a:t> </a:t>
-            </a:r>
-            <a:r>
-              <a:rPr lang="en-US" sz="2000" dirty="0" err="1" smtClean="0"/>
-              <a:t>BioRxiv</a:t>
-            </a:r>
-            <a:r>
-              <a:rPr lang="en-US" sz="2000" dirty="0" smtClean="0"/>
-              <a:t> Preprint: </a:t>
-            </a:r>
-            <a:r>
-              <a:rPr lang="fi-FI" sz="2000" dirty="0" smtClean="0"/>
-              <a:t>10.1101</a:t>
-            </a:r>
-            <a:r>
-              <a:rPr lang="fi-FI" sz="2000" dirty="0"/>
-              <a:t>/</a:t>
-            </a:r>
-            <a:r>
-              <a:rPr lang="fi-FI" sz="2000" dirty="0" smtClean="0"/>
-              <a:t>697755</a:t>
-            </a:r>
-            <a:endParaRPr lang="en-US" sz="2000" dirty="0" smtClean="0"/>
-          </a:p>
-          <a:p>
-            <a:r>
-              <a:rPr lang="en-US" sz="2000" dirty="0"/>
-              <a:t>Keys et al</a:t>
-            </a:r>
-            <a:r>
-              <a:rPr lang="en-US" sz="2000" i="1" dirty="0"/>
-              <a:t>. Iterative hard </a:t>
-            </a:r>
-            <a:r>
-              <a:rPr lang="en-US" sz="2000" i="1" dirty="0" err="1"/>
-              <a:t>thresholding</a:t>
-            </a:r>
-            <a:r>
-              <a:rPr lang="en-US" sz="2000" i="1" dirty="0"/>
-              <a:t> for model selection in genome-wide association studies.</a:t>
-            </a:r>
-            <a:r>
-              <a:rPr lang="en-US" sz="2000" dirty="0"/>
-              <a:t> </a:t>
-            </a:r>
-            <a:r>
-              <a:rPr lang="hu-HU" sz="2000" dirty="0"/>
-              <a:t>Genetic Epidemiology 2017;41:756–768</a:t>
-            </a:r>
-            <a:r>
-              <a:rPr lang="hu-HU" sz="2000" dirty="0" smtClean="0"/>
-              <a:t>.</a:t>
-            </a:r>
-            <a:endParaRPr lang="en-US" sz="2000" dirty="0" smtClean="0"/>
-          </a:p>
-          <a:p>
-            <a:r>
-              <a:rPr lang="en-US" sz="2000" dirty="0" smtClean="0"/>
-              <a:t>Zhou et </a:t>
-            </a:r>
-            <a:r>
-              <a:rPr lang="en-US" sz="2000" dirty="0"/>
-              <a:t>al. </a:t>
-            </a:r>
-            <a:r>
-              <a:rPr lang="en-US" sz="2000" i="1" dirty="0" err="1"/>
-              <a:t>OpenMendel</a:t>
-            </a:r>
-            <a:r>
-              <a:rPr lang="en-US" sz="2000" i="1" dirty="0"/>
-              <a:t>: a cooperative programming </a:t>
-            </a:r>
-            <a:r>
-              <a:rPr lang="en-US" sz="2000" i="1" dirty="0" smtClean="0"/>
-              <a:t>project for </a:t>
-            </a:r>
-            <a:r>
-              <a:rPr lang="en-US" sz="2000" i="1" dirty="0"/>
-              <a:t>statistical genetics. </a:t>
-            </a:r>
-            <a:r>
-              <a:rPr lang="en-US" sz="2000" dirty="0"/>
-              <a:t>Human Genetics 2019;p. 1–11</a:t>
-            </a:r>
-            <a:r>
-              <a:rPr lang="en-US" sz="2000" dirty="0" smtClean="0"/>
-              <a:t>.</a:t>
-            </a:r>
-          </a:p>
-        </p:txBody>
-      </p:sp>
-      <p:sp>
-        <p:nvSpPr>
-          <p:cNvPr id="6" name="Slide Number Placeholder 5"/>
+              <a:rPr lang="en-US" sz="2800" dirty="0"/>
+              <a:t>IHT is better than lasso and marginal </a:t>
+            </a:r>
+            <a:r>
+              <a:rPr lang="en-US" sz="2800" dirty="0" smtClean="0"/>
+              <a:t>tests</a:t>
+            </a:r>
+          </a:p>
+          <a:p>
+            <a:r>
+              <a:rPr lang="en-US" sz="2800" dirty="0" err="1" smtClean="0"/>
+              <a:t>MendelIHT</a:t>
+            </a:r>
+            <a:r>
+              <a:rPr lang="en-US" sz="2800" dirty="0" smtClean="0"/>
+              <a:t> works for generalized linear model regression problems</a:t>
+            </a:r>
+          </a:p>
+          <a:p>
+            <a:r>
+              <a:rPr lang="en-US" sz="2800" dirty="0" err="1" smtClean="0"/>
+              <a:t>MendelIHT</a:t>
+            </a:r>
+            <a:r>
+              <a:rPr lang="en-US" sz="2800" dirty="0" smtClean="0"/>
+              <a:t> is especially powerful for GWAS due to memory savings from compressed storage</a:t>
+            </a:r>
+            <a:endParaRPr lang="en-US" sz="2800" dirty="0"/>
+          </a:p>
+        </p:txBody>
+      </p:sp>
+      <p:sp>
+        <p:nvSpPr>
+          <p:cNvPr id="4" name="Slide Number Placeholder 3"/>
           <p:cNvSpPr>
             <a:spLocks noGrp="1"/>
           </p:cNvSpPr>
@@ -7100,13 +7257,9 @@
           <a:bodyPr/>
           <a:lstStyle/>
           <a:p>
-            <a:fld id="{4C958359-9322-6441-8715-055CBE9441BE}" type="slidenum">
-              <a:rPr lang="en-US" sz="1600" smtClean="0"/>
-              <a:t>9</a:t>
-            </a:fld>
             <a:r>
               <a:rPr lang="en-US" sz="1600" dirty="0" smtClean="0"/>
-              <a:t>/9</a:t>
+              <a:t>9/10</a:t>
             </a:r>
             <a:endParaRPr lang="en-US" sz="1600" dirty="0"/>
           </a:p>
@@ -7115,7 +7268,7 @@
     </p:spTree>
     <p:extLst>
       <p:ext uri="{BB962C8B-B14F-4D97-AF65-F5344CB8AC3E}">
-        <p14:creationId xmlns:p14="http://schemas.microsoft.com/office/powerpoint/2010/main" val="471840303"/>
+        <p14:creationId xmlns:p14="http://schemas.microsoft.com/office/powerpoint/2010/main" val="51064128"/>
       </p:ext>
     </p:extLst>
   </p:cSld>

</xml_diff>